<commit_message>
New (colorful) Architecture draft...
</commit_message>
<xml_diff>
--- a/Architecture.pptx
+++ b/Architecture.pptx
@@ -288,7 +288,7 @@
           <a:p>
             <a:fld id="{5AB710E5-5C32-4F77-B6A7-0C5F4289286C}" type="datetimeFigureOut">
               <a:rPr lang="de-DE" smtClean="0"/>
-              <a:t>16.08.2011</a:t>
+              <a:t>17.08.2011</a:t>
             </a:fld>
             <a:endParaRPr lang="de-DE"/>
           </a:p>
@@ -458,7 +458,7 @@
           <a:p>
             <a:fld id="{5AB710E5-5C32-4F77-B6A7-0C5F4289286C}" type="datetimeFigureOut">
               <a:rPr lang="de-DE" smtClean="0"/>
-              <a:t>16.08.2011</a:t>
+              <a:t>17.08.2011</a:t>
             </a:fld>
             <a:endParaRPr lang="de-DE"/>
           </a:p>
@@ -638,7 +638,7 @@
           <a:p>
             <a:fld id="{5AB710E5-5C32-4F77-B6A7-0C5F4289286C}" type="datetimeFigureOut">
               <a:rPr lang="de-DE" smtClean="0"/>
-              <a:t>16.08.2011</a:t>
+              <a:t>17.08.2011</a:t>
             </a:fld>
             <a:endParaRPr lang="de-DE"/>
           </a:p>
@@ -808,7 +808,7 @@
           <a:p>
             <a:fld id="{5AB710E5-5C32-4F77-B6A7-0C5F4289286C}" type="datetimeFigureOut">
               <a:rPr lang="de-DE" smtClean="0"/>
-              <a:t>16.08.2011</a:t>
+              <a:t>17.08.2011</a:t>
             </a:fld>
             <a:endParaRPr lang="de-DE"/>
           </a:p>
@@ -1054,7 +1054,7 @@
           <a:p>
             <a:fld id="{5AB710E5-5C32-4F77-B6A7-0C5F4289286C}" type="datetimeFigureOut">
               <a:rPr lang="de-DE" smtClean="0"/>
-              <a:t>16.08.2011</a:t>
+              <a:t>17.08.2011</a:t>
             </a:fld>
             <a:endParaRPr lang="de-DE"/>
           </a:p>
@@ -1342,7 +1342,7 @@
           <a:p>
             <a:fld id="{5AB710E5-5C32-4F77-B6A7-0C5F4289286C}" type="datetimeFigureOut">
               <a:rPr lang="de-DE" smtClean="0"/>
-              <a:t>16.08.2011</a:t>
+              <a:t>17.08.2011</a:t>
             </a:fld>
             <a:endParaRPr lang="de-DE"/>
           </a:p>
@@ -1764,7 +1764,7 @@
           <a:p>
             <a:fld id="{5AB710E5-5C32-4F77-B6A7-0C5F4289286C}" type="datetimeFigureOut">
               <a:rPr lang="de-DE" smtClean="0"/>
-              <a:t>16.08.2011</a:t>
+              <a:t>17.08.2011</a:t>
             </a:fld>
             <a:endParaRPr lang="de-DE"/>
           </a:p>
@@ -1882,7 +1882,7 @@
           <a:p>
             <a:fld id="{5AB710E5-5C32-4F77-B6A7-0C5F4289286C}" type="datetimeFigureOut">
               <a:rPr lang="de-DE" smtClean="0"/>
-              <a:t>16.08.2011</a:t>
+              <a:t>17.08.2011</a:t>
             </a:fld>
             <a:endParaRPr lang="de-DE"/>
           </a:p>
@@ -1977,7 +1977,7 @@
           <a:p>
             <a:fld id="{5AB710E5-5C32-4F77-B6A7-0C5F4289286C}" type="datetimeFigureOut">
               <a:rPr lang="de-DE" smtClean="0"/>
-              <a:t>16.08.2011</a:t>
+              <a:t>17.08.2011</a:t>
             </a:fld>
             <a:endParaRPr lang="de-DE"/>
           </a:p>
@@ -2254,7 +2254,7 @@
           <a:p>
             <a:fld id="{5AB710E5-5C32-4F77-B6A7-0C5F4289286C}" type="datetimeFigureOut">
               <a:rPr lang="de-DE" smtClean="0"/>
-              <a:t>16.08.2011</a:t>
+              <a:t>17.08.2011</a:t>
             </a:fld>
             <a:endParaRPr lang="de-DE"/>
           </a:p>
@@ -2507,7 +2507,7 @@
           <a:p>
             <a:fld id="{5AB710E5-5C32-4F77-B6A7-0C5F4289286C}" type="datetimeFigureOut">
               <a:rPr lang="de-DE" smtClean="0"/>
-              <a:t>16.08.2011</a:t>
+              <a:t>17.08.2011</a:t>
             </a:fld>
             <a:endParaRPr lang="de-DE"/>
           </a:p>
@@ -2720,7 +2720,7 @@
           <a:p>
             <a:fld id="{5AB710E5-5C32-4F77-B6A7-0C5F4289286C}" type="datetimeFigureOut">
               <a:rPr lang="de-DE" smtClean="0"/>
-              <a:t>16.08.2011</a:t>
+              <a:t>17.08.2011</a:t>
             </a:fld>
             <a:endParaRPr lang="de-DE"/>
           </a:p>
@@ -3159,198 +3159,6 @@
           </a:extLst>
         </p:spPr>
       </p:pic>
-      <p:pic>
-        <p:nvPicPr>
-          <p:cNvPr id="1028" name="Picture 4"/>
-          <p:cNvPicPr>
-            <a:picLocks noChangeAspect="1" noChangeArrowheads="1"/>
-          </p:cNvPicPr>
-          <p:nvPr/>
-        </p:nvPicPr>
-        <p:blipFill>
-          <a:blip r:embed="rId3">
-            <a:extLst>
-              <a:ext uri="{28A0092B-C50C-407E-A947-70E740481C1C}">
-                <a14:useLocalDpi xmlns:a14="http://schemas.microsoft.com/office/drawing/2010/main" val="0"/>
-              </a:ext>
-            </a:extLst>
-          </a:blip>
-          <a:srcRect/>
-          <a:stretch>
-            <a:fillRect/>
-          </a:stretch>
-        </p:blipFill>
-        <p:spPr bwMode="auto">
-          <a:xfrm>
-            <a:off x="3217512" y="265944"/>
-            <a:ext cx="981075" cy="1143000"/>
-          </a:xfrm>
-          <a:prstGeom prst="rect">
-            <a:avLst/>
-          </a:prstGeom>
-          <a:noFill/>
-          <a:ln>
-            <a:noFill/>
-          </a:ln>
-          <a:effectLst/>
-          <a:extLst>
-            <a:ext uri="{909E8E84-426E-40DD-AFC4-6F175D3DCCD1}">
-              <a14:hiddenFill xmlns:a14="http://schemas.microsoft.com/office/drawing/2010/main">
-                <a:solidFill>
-                  <a:schemeClr val="accent1"/>
-                </a:solidFill>
-              </a14:hiddenFill>
-            </a:ext>
-            <a:ext uri="{91240B29-F687-4F45-9708-019B960494DF}">
-              <a14:hiddenLine xmlns:a14="http://schemas.microsoft.com/office/drawing/2010/main" w="9525">
-                <a:solidFill>
-                  <a:schemeClr val="tx1"/>
-                </a:solidFill>
-                <a:miter lim="800000"/>
-                <a:headEnd/>
-                <a:tailEnd/>
-              </a14:hiddenLine>
-            </a:ext>
-            <a:ext uri="{AF507438-7753-43E0-B8FC-AC1667EBCBE1}">
-              <a14:hiddenEffects xmlns:a14="http://schemas.microsoft.com/office/drawing/2010/main">
-                <a:effectLst>
-                  <a:outerShdw dist="35921" dir="2700000" algn="ctr" rotWithShape="0">
-                    <a:schemeClr val="bg2"/>
-                  </a:outerShdw>
-                </a:effectLst>
-              </a14:hiddenEffects>
-            </a:ext>
-          </a:extLst>
-        </p:spPr>
-      </p:pic>
-      <p:pic>
-        <p:nvPicPr>
-          <p:cNvPr id="1029" name="Picture 5"/>
-          <p:cNvPicPr>
-            <a:picLocks noChangeAspect="1" noChangeArrowheads="1"/>
-          </p:cNvPicPr>
-          <p:nvPr/>
-        </p:nvPicPr>
-        <p:blipFill>
-          <a:blip r:embed="rId4">
-            <a:extLst>
-              <a:ext uri="{28A0092B-C50C-407E-A947-70E740481C1C}">
-                <a14:useLocalDpi xmlns:a14="http://schemas.microsoft.com/office/drawing/2010/main" val="0"/>
-              </a:ext>
-            </a:extLst>
-          </a:blip>
-          <a:srcRect/>
-          <a:stretch>
-            <a:fillRect/>
-          </a:stretch>
-        </p:blipFill>
-        <p:spPr bwMode="auto">
-          <a:xfrm>
-            <a:off x="6804248" y="411038"/>
-            <a:ext cx="933450" cy="962025"/>
-          </a:xfrm>
-          <a:prstGeom prst="rect">
-            <a:avLst/>
-          </a:prstGeom>
-          <a:noFill/>
-          <a:ln>
-            <a:noFill/>
-          </a:ln>
-          <a:effectLst/>
-          <a:extLst>
-            <a:ext uri="{909E8E84-426E-40DD-AFC4-6F175D3DCCD1}">
-              <a14:hiddenFill xmlns:a14="http://schemas.microsoft.com/office/drawing/2010/main">
-                <a:solidFill>
-                  <a:schemeClr val="accent1"/>
-                </a:solidFill>
-              </a14:hiddenFill>
-            </a:ext>
-            <a:ext uri="{91240B29-F687-4F45-9708-019B960494DF}">
-              <a14:hiddenLine xmlns:a14="http://schemas.microsoft.com/office/drawing/2010/main" w="9525">
-                <a:solidFill>
-                  <a:schemeClr val="tx1"/>
-                </a:solidFill>
-                <a:miter lim="800000"/>
-                <a:headEnd/>
-                <a:tailEnd/>
-              </a14:hiddenLine>
-            </a:ext>
-            <a:ext uri="{AF507438-7753-43E0-B8FC-AC1667EBCBE1}">
-              <a14:hiddenEffects xmlns:a14="http://schemas.microsoft.com/office/drawing/2010/main">
-                <a:effectLst>
-                  <a:outerShdw dist="35921" dir="2700000" algn="ctr" rotWithShape="0">
-                    <a:schemeClr val="bg2"/>
-                  </a:outerShdw>
-                </a:effectLst>
-              </a14:hiddenEffects>
-            </a:ext>
-          </a:extLst>
-        </p:spPr>
-      </p:pic>
-      <p:pic>
-        <p:nvPicPr>
-          <p:cNvPr id="1030" name="Picture 6"/>
-          <p:cNvPicPr>
-            <a:picLocks noChangeAspect="1" noChangeArrowheads="1"/>
-          </p:cNvPicPr>
-          <p:nvPr/>
-        </p:nvPicPr>
-        <p:blipFill>
-          <a:blip r:embed="rId5">
-            <a:extLst>
-              <a:ext uri="{28A0092B-C50C-407E-A947-70E740481C1C}">
-                <a14:useLocalDpi xmlns:a14="http://schemas.microsoft.com/office/drawing/2010/main" val="0"/>
-              </a:ext>
-            </a:extLst>
-          </a:blip>
-          <a:srcRect/>
-          <a:stretch>
-            <a:fillRect/>
-          </a:stretch>
-        </p:blipFill>
-        <p:spPr bwMode="auto">
-          <a:xfrm>
-            <a:off x="8028384" y="504738"/>
-            <a:ext cx="885825" cy="685800"/>
-          </a:xfrm>
-          <a:prstGeom prst="rect">
-            <a:avLst/>
-          </a:prstGeom>
-          <a:noFill/>
-          <a:ln>
-            <a:noFill/>
-          </a:ln>
-          <a:effectLst/>
-          <a:extLst>
-            <a:ext uri="{909E8E84-426E-40DD-AFC4-6F175D3DCCD1}">
-              <a14:hiddenFill xmlns:a14="http://schemas.microsoft.com/office/drawing/2010/main">
-                <a:solidFill>
-                  <a:schemeClr val="accent1"/>
-                </a:solidFill>
-              </a14:hiddenFill>
-            </a:ext>
-            <a:ext uri="{91240B29-F687-4F45-9708-019B960494DF}">
-              <a14:hiddenLine xmlns:a14="http://schemas.microsoft.com/office/drawing/2010/main" w="9525">
-                <a:solidFill>
-                  <a:schemeClr val="tx1"/>
-                </a:solidFill>
-                <a:miter lim="800000"/>
-                <a:headEnd/>
-                <a:tailEnd/>
-              </a14:hiddenLine>
-            </a:ext>
-            <a:ext uri="{AF507438-7753-43E0-B8FC-AC1667EBCBE1}">
-              <a14:hiddenEffects xmlns:a14="http://schemas.microsoft.com/office/drawing/2010/main">
-                <a:effectLst>
-                  <a:outerShdw dist="35921" dir="2700000" algn="ctr" rotWithShape="0">
-                    <a:schemeClr val="bg2"/>
-                  </a:outerShdw>
-                </a:effectLst>
-              </a14:hiddenEffects>
-            </a:ext>
-          </a:extLst>
-        </p:spPr>
-      </p:pic>
       <p:sp>
         <p:nvSpPr>
           <p:cNvPr id="6" name="Pfeil nach links und rechts 5"/>
@@ -3359,7 +3167,7 @@
         </p:nvSpPr>
         <p:spPr>
           <a:xfrm>
-            <a:off x="1547664" y="476672"/>
+            <a:off x="1691680" y="542466"/>
             <a:ext cx="1656184" cy="648072"/>
           </a:xfrm>
           <a:prstGeom prst="leftRightArrow">
@@ -3405,8 +3213,8 @@
         </p:nvSpPr>
         <p:spPr>
           <a:xfrm>
-            <a:off x="4716016" y="476672"/>
-            <a:ext cx="1656184" cy="648072"/>
+            <a:off x="5164635" y="559483"/>
+            <a:ext cx="1135555" cy="648072"/>
           </a:xfrm>
           <a:prstGeom prst="leftRightArrow">
             <a:avLst/>
@@ -3431,11 +3239,522 @@
           <a:lstStyle/>
           <a:p>
             <a:pPr algn="ctr"/>
+            <a:endParaRPr lang="de-DE" sz="1200" dirty="0"/>
+          </a:p>
+        </p:txBody>
+      </p:sp>
+      <p:sp>
+        <p:nvSpPr>
+          <p:cNvPr id="2" name="Rechteckige Legende 1"/>
+          <p:cNvSpPr/>
+          <p:nvPr/>
+        </p:nvSpPr>
+        <p:spPr>
+          <a:xfrm>
+            <a:off x="287722" y="1772817"/>
+            <a:ext cx="1224136" cy="576064"/>
+          </a:xfrm>
+          <a:prstGeom prst="wedgeRectCallout">
+            <a:avLst>
+              <a:gd name="adj1" fmla="val -18905"/>
+              <a:gd name="adj2" fmla="val -106753"/>
+            </a:avLst>
+          </a:prstGeom>
+        </p:spPr>
+        <p:style>
+          <a:lnRef idx="1">
+            <a:schemeClr val="accent2"/>
+          </a:lnRef>
+          <a:fillRef idx="2">
+            <a:schemeClr val="accent2"/>
+          </a:fillRef>
+          <a:effectRef idx="1">
+            <a:schemeClr val="accent2"/>
+          </a:effectRef>
+          <a:fontRef idx="minor">
+            <a:schemeClr val="dk1"/>
+          </a:fontRef>
+        </p:style>
+        <p:txBody>
+          <a:bodyPr rtlCol="0" anchor="ctr"/>
+          <a:lstStyle/>
+          <a:p>
+            <a:pPr algn="ctr"/>
+            <a:r>
+              <a:rPr lang="de-DE" sz="1400" dirty="0" smtClean="0"/>
+              <a:t>Relationale Daten</a:t>
+            </a:r>
+            <a:endParaRPr lang="de-DE" sz="1400" dirty="0"/>
+          </a:p>
+        </p:txBody>
+      </p:sp>
+      <p:sp>
+        <p:nvSpPr>
+          <p:cNvPr id="11" name="Flussdiagramm: Daten 10"/>
+          <p:cNvSpPr/>
+          <p:nvPr/>
+        </p:nvSpPr>
+        <p:spPr>
+          <a:xfrm>
+            <a:off x="3436443" y="343459"/>
+            <a:ext cx="1728192" cy="1080120"/>
+          </a:xfrm>
+          <a:prstGeom prst="flowChartInputOutput">
+            <a:avLst/>
+          </a:prstGeom>
+        </p:spPr>
+        <p:style>
+          <a:lnRef idx="1">
+            <a:schemeClr val="accent3"/>
+          </a:lnRef>
+          <a:fillRef idx="2">
+            <a:schemeClr val="accent3"/>
+          </a:fillRef>
+          <a:effectRef idx="1">
+            <a:schemeClr val="accent3"/>
+          </a:effectRef>
+          <a:fontRef idx="minor">
+            <a:schemeClr val="dk1"/>
+          </a:fontRef>
+        </p:style>
+        <p:txBody>
+          <a:bodyPr rtlCol="0" anchor="ctr"/>
+          <a:lstStyle/>
+          <a:p>
+            <a:pPr algn="ctr"/>
+            <a:r>
+              <a:rPr lang="de-DE" sz="1400" dirty="0" err="1" smtClean="0"/>
+              <a:t>Entity</a:t>
+            </a:r>
+            <a:r>
+              <a:rPr lang="de-DE" sz="1400" dirty="0" smtClean="0"/>
+              <a:t> Framework Objekte</a:t>
+            </a:r>
+            <a:endParaRPr lang="de-DE" sz="1400" dirty="0"/>
+          </a:p>
+        </p:txBody>
+      </p:sp>
+      <p:sp>
+        <p:nvSpPr>
+          <p:cNvPr id="29" name="Flussdiagramm: Vordefinierter Prozess 28"/>
+          <p:cNvSpPr/>
+          <p:nvPr/>
+        </p:nvSpPr>
+        <p:spPr>
+          <a:xfrm>
+            <a:off x="6444208" y="515630"/>
+            <a:ext cx="2304256" cy="777052"/>
+          </a:xfrm>
+          <a:prstGeom prst="flowChartPredefinedProcess">
+            <a:avLst/>
+          </a:prstGeom>
+        </p:spPr>
+        <p:style>
+          <a:lnRef idx="1">
+            <a:schemeClr val="accent4"/>
+          </a:lnRef>
+          <a:fillRef idx="2">
+            <a:schemeClr val="accent4"/>
+          </a:fillRef>
+          <a:effectRef idx="1">
+            <a:schemeClr val="accent4"/>
+          </a:effectRef>
+          <a:fontRef idx="minor">
+            <a:schemeClr val="dk1"/>
+          </a:fontRef>
+        </p:style>
+        <p:txBody>
+          <a:bodyPr rtlCol="0" anchor="ctr"/>
+          <a:lstStyle/>
+          <a:p>
+            <a:pPr algn="ctr"/>
+            <a:r>
+              <a:rPr lang="de-DE" sz="1400" dirty="0" err="1" smtClean="0"/>
+              <a:t>DiversityService</a:t>
+            </a:r>
+            <a:endParaRPr lang="de-DE" sz="1400" dirty="0" smtClean="0"/>
+          </a:p>
+          <a:p>
+            <a:pPr algn="ctr"/>
+            <a:r>
+              <a:rPr lang="de-DE" sz="1000" i="1" dirty="0"/>
+              <a:t>(</a:t>
+            </a:r>
+            <a:r>
+              <a:rPr lang="de-DE" sz="1000" i="1" dirty="0" err="1" smtClean="0"/>
+              <a:t>DiversityService.Service</a:t>
+            </a:r>
+            <a:r>
+              <a:rPr lang="de-DE" sz="1000" i="1" dirty="0" smtClean="0"/>
+              <a:t>)</a:t>
+            </a:r>
+            <a:endParaRPr lang="de-DE" sz="1000" dirty="0"/>
+          </a:p>
+          <a:p>
+            <a:pPr algn="ctr"/>
+            <a:endParaRPr lang="de-DE" sz="1400" dirty="0"/>
+          </a:p>
+        </p:txBody>
+      </p:sp>
+      <p:sp>
+        <p:nvSpPr>
+          <p:cNvPr id="34" name="Pfeil nach links und rechts 33"/>
+          <p:cNvSpPr/>
+          <p:nvPr/>
+        </p:nvSpPr>
+        <p:spPr>
+          <a:xfrm rot="16200000">
+            <a:off x="7133686" y="1562193"/>
+            <a:ext cx="925301" cy="648072"/>
+          </a:xfrm>
+          <a:prstGeom prst="leftRightArrow">
+            <a:avLst/>
+          </a:prstGeom>
+        </p:spPr>
+        <p:style>
+          <a:lnRef idx="1">
+            <a:schemeClr val="accent1"/>
+          </a:lnRef>
+          <a:fillRef idx="2">
+            <a:schemeClr val="accent1"/>
+          </a:fillRef>
+          <a:effectRef idx="1">
+            <a:schemeClr val="accent1"/>
+          </a:effectRef>
+          <a:fontRef idx="minor">
+            <a:schemeClr val="dk1"/>
+          </a:fontRef>
+        </p:style>
+        <p:txBody>
+          <a:bodyPr rtlCol="0" anchor="ctr"/>
+          <a:lstStyle/>
+          <a:p>
+            <a:pPr algn="ctr"/>
+            <a:endParaRPr lang="de-DE" sz="1200" dirty="0"/>
+          </a:p>
+        </p:txBody>
+      </p:sp>
+      <p:sp>
+        <p:nvSpPr>
+          <p:cNvPr id="35" name="Flussdiagramm: Daten 34"/>
+          <p:cNvSpPr/>
+          <p:nvPr/>
+        </p:nvSpPr>
+        <p:spPr>
+          <a:xfrm>
+            <a:off x="6156176" y="2490978"/>
+            <a:ext cx="2703161" cy="1141325"/>
+          </a:xfrm>
+          <a:prstGeom prst="flowChartInputOutput">
+            <a:avLst/>
+          </a:prstGeom>
+        </p:spPr>
+        <p:style>
+          <a:lnRef idx="1">
+            <a:schemeClr val="accent3"/>
+          </a:lnRef>
+          <a:fillRef idx="2">
+            <a:schemeClr val="accent3"/>
+          </a:fillRef>
+          <a:effectRef idx="1">
+            <a:schemeClr val="accent3"/>
+          </a:effectRef>
+          <a:fontRef idx="minor">
+            <a:schemeClr val="dk1"/>
+          </a:fontRef>
+        </p:style>
+        <p:txBody>
+          <a:bodyPr rtlCol="0" anchor="ctr"/>
+          <a:lstStyle/>
+          <a:p>
+            <a:pPr algn="ctr"/>
+            <a:r>
+              <a:rPr lang="de-DE" sz="1400" dirty="0" smtClean="0"/>
+              <a:t>Vereinfachtes Datenmodell</a:t>
+            </a:r>
+          </a:p>
+          <a:p>
+            <a:pPr algn="ctr"/>
+            <a:r>
+              <a:rPr lang="de-DE" sz="1000" i="1" dirty="0" smtClean="0"/>
+              <a:t>(</a:t>
+            </a:r>
+            <a:r>
+              <a:rPr lang="de-DE" sz="1000" i="1" dirty="0" err="1" smtClean="0"/>
+              <a:t>DiversityService.Model</a:t>
+            </a:r>
+            <a:r>
+              <a:rPr lang="de-DE" sz="1000" i="1" dirty="0" smtClean="0"/>
+              <a:t>)</a:t>
+            </a:r>
+            <a:endParaRPr lang="de-DE" sz="1400" dirty="0"/>
+          </a:p>
+        </p:txBody>
+      </p:sp>
+      <p:sp>
+        <p:nvSpPr>
+          <p:cNvPr id="36" name="Pfeil nach links und rechts 35"/>
+          <p:cNvSpPr/>
+          <p:nvPr/>
+        </p:nvSpPr>
+        <p:spPr>
+          <a:xfrm rot="20886686">
+            <a:off x="3144258" y="3110444"/>
+            <a:ext cx="2567453" cy="648072"/>
+          </a:xfrm>
+          <a:prstGeom prst="leftRightArrow">
+            <a:avLst/>
+          </a:prstGeom>
+        </p:spPr>
+        <p:style>
+          <a:lnRef idx="1">
+            <a:schemeClr val="accent1"/>
+          </a:lnRef>
+          <a:fillRef idx="2">
+            <a:schemeClr val="accent1"/>
+          </a:fillRef>
+          <a:effectRef idx="1">
+            <a:schemeClr val="accent1"/>
+          </a:effectRef>
+          <a:fontRef idx="minor">
+            <a:schemeClr val="dk1"/>
+          </a:fontRef>
+        </p:style>
+        <p:txBody>
+          <a:bodyPr rtlCol="0" anchor="ctr"/>
+          <a:lstStyle/>
+          <a:p>
+            <a:pPr algn="ctr"/>
             <a:r>
               <a:rPr lang="de-DE" sz="1200" dirty="0" smtClean="0"/>
-              <a:t>WCF</a:t>
+              <a:t>WCF (XML-</a:t>
+            </a:r>
+            <a:r>
+              <a:rPr lang="de-DE" sz="1200" dirty="0" err="1" smtClean="0"/>
+              <a:t>Serialisierung</a:t>
+            </a:r>
+            <a:r>
+              <a:rPr lang="de-DE" sz="1200" dirty="0" smtClean="0"/>
+              <a:t>)</a:t>
             </a:r>
             <a:endParaRPr lang="de-DE" sz="1200" dirty="0"/>
+          </a:p>
+        </p:txBody>
+      </p:sp>
+      <p:sp>
+        <p:nvSpPr>
+          <p:cNvPr id="37" name="Flussdiagramm: Daten 36"/>
+          <p:cNvSpPr/>
+          <p:nvPr/>
+        </p:nvSpPr>
+        <p:spPr>
+          <a:xfrm>
+            <a:off x="160277" y="3284984"/>
+            <a:ext cx="2703161" cy="1141325"/>
+          </a:xfrm>
+          <a:prstGeom prst="flowChartInputOutput">
+            <a:avLst/>
+          </a:prstGeom>
+        </p:spPr>
+        <p:style>
+          <a:lnRef idx="1">
+            <a:schemeClr val="accent3"/>
+          </a:lnRef>
+          <a:fillRef idx="2">
+            <a:schemeClr val="accent3"/>
+          </a:fillRef>
+          <a:effectRef idx="1">
+            <a:schemeClr val="accent3"/>
+          </a:effectRef>
+          <a:fontRef idx="minor">
+            <a:schemeClr val="dk1"/>
+          </a:fontRef>
+        </p:style>
+        <p:txBody>
+          <a:bodyPr rtlCol="0" anchor="ctr"/>
+          <a:lstStyle/>
+          <a:p>
+            <a:pPr algn="ctr"/>
+            <a:r>
+              <a:rPr lang="de-DE" sz="1400" dirty="0" smtClean="0"/>
+              <a:t>Vereinfachtes Datenmodell</a:t>
+            </a:r>
+          </a:p>
+          <a:p>
+            <a:pPr algn="ctr"/>
+            <a:r>
+              <a:rPr lang="de-DE" sz="1000" i="1" dirty="0" smtClean="0"/>
+              <a:t>(</a:t>
+            </a:r>
+            <a:r>
+              <a:rPr lang="de-DE" sz="1000" i="1" dirty="0" err="1" smtClean="0"/>
+              <a:t>DiversityService.Model</a:t>
+            </a:r>
+            <a:r>
+              <a:rPr lang="de-DE" sz="1000" i="1" dirty="0" smtClean="0"/>
+              <a:t>)</a:t>
+            </a:r>
+            <a:endParaRPr lang="de-DE" sz="1400" dirty="0"/>
+          </a:p>
+        </p:txBody>
+      </p:sp>
+      <p:sp>
+        <p:nvSpPr>
+          <p:cNvPr id="38" name="Pfeil nach links und rechts 37"/>
+          <p:cNvSpPr/>
+          <p:nvPr/>
+        </p:nvSpPr>
+        <p:spPr>
+          <a:xfrm rot="16200000">
+            <a:off x="1049208" y="4719742"/>
+            <a:ext cx="925301" cy="648072"/>
+          </a:xfrm>
+          <a:prstGeom prst="leftRightArrow">
+            <a:avLst/>
+          </a:prstGeom>
+        </p:spPr>
+        <p:style>
+          <a:lnRef idx="1">
+            <a:schemeClr val="accent1"/>
+          </a:lnRef>
+          <a:fillRef idx="2">
+            <a:schemeClr val="accent1"/>
+          </a:fillRef>
+          <a:effectRef idx="1">
+            <a:schemeClr val="accent1"/>
+          </a:effectRef>
+          <a:fontRef idx="minor">
+            <a:schemeClr val="dk1"/>
+          </a:fontRef>
+        </p:style>
+        <p:txBody>
+          <a:bodyPr rtlCol="0" anchor="ctr"/>
+          <a:lstStyle/>
+          <a:p>
+            <a:pPr algn="ctr"/>
+            <a:endParaRPr lang="de-DE" sz="1200" dirty="0"/>
+          </a:p>
+        </p:txBody>
+      </p:sp>
+      <p:sp>
+        <p:nvSpPr>
+          <p:cNvPr id="30" name="Flussdiagramm: Prozess 29"/>
+          <p:cNvSpPr/>
+          <p:nvPr/>
+        </p:nvSpPr>
+        <p:spPr>
+          <a:xfrm>
+            <a:off x="683766" y="5661248"/>
+            <a:ext cx="1656184" cy="792088"/>
+          </a:xfrm>
+          <a:prstGeom prst="flowChartProcess">
+            <a:avLst/>
+          </a:prstGeom>
+        </p:spPr>
+        <p:style>
+          <a:lnRef idx="1">
+            <a:schemeClr val="accent4"/>
+          </a:lnRef>
+          <a:fillRef idx="2">
+            <a:schemeClr val="accent4"/>
+          </a:fillRef>
+          <a:effectRef idx="1">
+            <a:schemeClr val="accent4"/>
+          </a:effectRef>
+          <a:fontRef idx="minor">
+            <a:schemeClr val="dk1"/>
+          </a:fontRef>
+        </p:style>
+        <p:txBody>
+          <a:bodyPr rtlCol="0" anchor="ctr"/>
+          <a:lstStyle/>
+          <a:p>
+            <a:pPr algn="ctr"/>
+            <a:r>
+              <a:rPr lang="de-DE" dirty="0" err="1" smtClean="0"/>
+              <a:t>DiversityPhone</a:t>
+            </a:r>
+            <a:endParaRPr lang="de-DE" dirty="0"/>
+          </a:p>
+        </p:txBody>
+      </p:sp>
+      <p:sp>
+        <p:nvSpPr>
+          <p:cNvPr id="31" name="Flussdiagramm: Manuelle Eingabe 30"/>
+          <p:cNvSpPr/>
+          <p:nvPr/>
+        </p:nvSpPr>
+        <p:spPr>
+          <a:xfrm>
+            <a:off x="6299607" y="5583838"/>
+            <a:ext cx="2088232" cy="946907"/>
+          </a:xfrm>
+          <a:prstGeom prst="flowChartManualInput">
+            <a:avLst/>
+          </a:prstGeom>
+        </p:spPr>
+        <p:style>
+          <a:lnRef idx="1">
+            <a:schemeClr val="accent5"/>
+          </a:lnRef>
+          <a:fillRef idx="2">
+            <a:schemeClr val="accent5"/>
+          </a:fillRef>
+          <a:effectRef idx="1">
+            <a:schemeClr val="accent5"/>
+          </a:effectRef>
+          <a:fontRef idx="minor">
+            <a:schemeClr val="dk1"/>
+          </a:fontRef>
+        </p:style>
+        <p:txBody>
+          <a:bodyPr rtlCol="0" anchor="ctr"/>
+          <a:lstStyle/>
+          <a:p>
+            <a:pPr algn="ctr"/>
+            <a:r>
+              <a:rPr lang="de-DE" dirty="0" smtClean="0"/>
+              <a:t>Dateneingabe</a:t>
+            </a:r>
+            <a:endParaRPr lang="de-DE" dirty="0"/>
+          </a:p>
+        </p:txBody>
+      </p:sp>
+      <p:sp>
+        <p:nvSpPr>
+          <p:cNvPr id="32" name="Pfeil nach links 31"/>
+          <p:cNvSpPr/>
+          <p:nvPr/>
+        </p:nvSpPr>
+        <p:spPr>
+          <a:xfrm>
+            <a:off x="2699792" y="5820565"/>
+            <a:ext cx="3384376" cy="473453"/>
+          </a:xfrm>
+          <a:prstGeom prst="leftArrow">
+            <a:avLst/>
+          </a:prstGeom>
+        </p:spPr>
+        <p:style>
+          <a:lnRef idx="1">
+            <a:schemeClr val="accent1"/>
+          </a:lnRef>
+          <a:fillRef idx="2">
+            <a:schemeClr val="accent1"/>
+          </a:fillRef>
+          <a:effectRef idx="1">
+            <a:schemeClr val="accent1"/>
+          </a:effectRef>
+          <a:fontRef idx="minor">
+            <a:schemeClr val="dk1"/>
+          </a:fontRef>
+        </p:style>
+        <p:txBody>
+          <a:bodyPr rtlCol="0" anchor="ctr"/>
+          <a:lstStyle/>
+          <a:p>
+            <a:pPr algn="ctr"/>
+            <a:endParaRPr lang="de-DE"/>
           </a:p>
         </p:txBody>
       </p:sp>

</xml_diff>